<commit_message>
Ya voy a subir los cambios porque por fin terminé. I'm free
</commit_message>
<xml_diff>
--- a/Regresiones lineales y modelo.pptx
+++ b/Regresiones lineales y modelo.pptx
@@ -269,7 +269,7 @@
           <a:p>
             <a:fld id="{53E4F345-E64C-4B17-AEB0-9F975538DF18}" type="datetimeFigureOut">
               <a:rPr lang="es-MX" smtClean="0"/>
-              <a:t>26/05/2023</a:t>
+              <a:t>30/05/2023</a:t>
             </a:fld>
             <a:endParaRPr lang="es-MX"/>
           </a:p>
@@ -469,7 +469,7 @@
           <a:p>
             <a:fld id="{53E4F345-E64C-4B17-AEB0-9F975538DF18}" type="datetimeFigureOut">
               <a:rPr lang="es-MX" smtClean="0"/>
-              <a:t>26/05/2023</a:t>
+              <a:t>30/05/2023</a:t>
             </a:fld>
             <a:endParaRPr lang="es-MX"/>
           </a:p>
@@ -679,7 +679,7 @@
           <a:p>
             <a:fld id="{53E4F345-E64C-4B17-AEB0-9F975538DF18}" type="datetimeFigureOut">
               <a:rPr lang="es-MX" smtClean="0"/>
-              <a:t>26/05/2023</a:t>
+              <a:t>30/05/2023</a:t>
             </a:fld>
             <a:endParaRPr lang="es-MX"/>
           </a:p>
@@ -879,7 +879,7 @@
           <a:p>
             <a:fld id="{53E4F345-E64C-4B17-AEB0-9F975538DF18}" type="datetimeFigureOut">
               <a:rPr lang="es-MX" smtClean="0"/>
-              <a:t>26/05/2023</a:t>
+              <a:t>30/05/2023</a:t>
             </a:fld>
             <a:endParaRPr lang="es-MX"/>
           </a:p>
@@ -1155,7 +1155,7 @@
           <a:p>
             <a:fld id="{53E4F345-E64C-4B17-AEB0-9F975538DF18}" type="datetimeFigureOut">
               <a:rPr lang="es-MX" smtClean="0"/>
-              <a:t>26/05/2023</a:t>
+              <a:t>30/05/2023</a:t>
             </a:fld>
             <a:endParaRPr lang="es-MX"/>
           </a:p>
@@ -1423,7 +1423,7 @@
           <a:p>
             <a:fld id="{53E4F345-E64C-4B17-AEB0-9F975538DF18}" type="datetimeFigureOut">
               <a:rPr lang="es-MX" smtClean="0"/>
-              <a:t>26/05/2023</a:t>
+              <a:t>30/05/2023</a:t>
             </a:fld>
             <a:endParaRPr lang="es-MX"/>
           </a:p>
@@ -1838,7 +1838,7 @@
           <a:p>
             <a:fld id="{53E4F345-E64C-4B17-AEB0-9F975538DF18}" type="datetimeFigureOut">
               <a:rPr lang="es-MX" smtClean="0"/>
-              <a:t>26/05/2023</a:t>
+              <a:t>30/05/2023</a:t>
             </a:fld>
             <a:endParaRPr lang="es-MX"/>
           </a:p>
@@ -1980,7 +1980,7 @@
           <a:p>
             <a:fld id="{53E4F345-E64C-4B17-AEB0-9F975538DF18}" type="datetimeFigureOut">
               <a:rPr lang="es-MX" smtClean="0"/>
-              <a:t>26/05/2023</a:t>
+              <a:t>30/05/2023</a:t>
             </a:fld>
             <a:endParaRPr lang="es-MX"/>
           </a:p>
@@ -2093,7 +2093,7 @@
           <a:p>
             <a:fld id="{53E4F345-E64C-4B17-AEB0-9F975538DF18}" type="datetimeFigureOut">
               <a:rPr lang="es-MX" smtClean="0"/>
-              <a:t>26/05/2023</a:t>
+              <a:t>30/05/2023</a:t>
             </a:fld>
             <a:endParaRPr lang="es-MX"/>
           </a:p>
@@ -2406,7 +2406,7 @@
           <a:p>
             <a:fld id="{53E4F345-E64C-4B17-AEB0-9F975538DF18}" type="datetimeFigureOut">
               <a:rPr lang="es-MX" smtClean="0"/>
-              <a:t>26/05/2023</a:t>
+              <a:t>30/05/2023</a:t>
             </a:fld>
             <a:endParaRPr lang="es-MX"/>
           </a:p>
@@ -2695,7 +2695,7 @@
           <a:p>
             <a:fld id="{53E4F345-E64C-4B17-AEB0-9F975538DF18}" type="datetimeFigureOut">
               <a:rPr lang="es-MX" smtClean="0"/>
-              <a:t>26/05/2023</a:t>
+              <a:t>30/05/2023</a:t>
             </a:fld>
             <a:endParaRPr lang="es-MX"/>
           </a:p>
@@ -2938,7 +2938,7 @@
           <a:p>
             <a:fld id="{53E4F345-E64C-4B17-AEB0-9F975538DF18}" type="datetimeFigureOut">
               <a:rPr lang="es-MX" smtClean="0"/>
-              <a:t>26/05/2023</a:t>
+              <a:t>30/05/2023</a:t>
             </a:fld>
             <a:endParaRPr lang="es-MX"/>
           </a:p>
@@ -3606,12 +3606,12 @@
                     <a:p>
                       <a:pPr algn="ctr" fontAlgn="ctr"/>
                       <a:r>
-                        <a:rPr lang="es-MX" sz="1100" u="none" strike="noStrike">
+                        <a:rPr lang="es-MX" sz="1100" u="none" strike="noStrike" dirty="0">
                           <a:effectLst/>
                         </a:rPr>
                         <a:t>EI</a:t>
                       </a:r>
-                      <a:endParaRPr lang="es-MX" sz="1100" b="1" i="0" u="none" strike="noStrike">
+                      <a:endParaRPr lang="es-MX" sz="1100" b="1" i="0" u="none" strike="noStrike" dirty="0">
                         <a:solidFill>
                           <a:srgbClr val="000000"/>
                         </a:solidFill>
@@ -13680,12 +13680,12 @@
                     <a:p>
                       <a:pPr algn="ctr" fontAlgn="ctr"/>
                       <a:r>
-                        <a:rPr lang="es-MX" sz="1100" u="none" strike="noStrike">
+                        <a:rPr lang="es-MX" sz="1100" u="none" strike="noStrike" dirty="0">
                           <a:effectLst/>
                         </a:rPr>
                         <a:t> </a:t>
                       </a:r>
-                      <a:endParaRPr lang="es-MX" sz="1100" b="0" i="0" u="none" strike="noStrike">
+                      <a:endParaRPr lang="es-MX" sz="1100" b="0" i="0" u="none" strike="noStrike" dirty="0">
                         <a:solidFill>
                           <a:srgbClr val="000000"/>
                         </a:solidFill>
@@ -15874,13 +15874,13 @@
           <p:nvPr>
             <p:extLst>
               <p:ext uri="{D42A27DB-BD31-4B8C-83A1-F6EECF244321}">
-                <p14:modId xmlns:p14="http://schemas.microsoft.com/office/powerpoint/2010/main" val="1055991756"/>
+                <p14:modId xmlns:p14="http://schemas.microsoft.com/office/powerpoint/2010/main" val="1277376150"/>
               </p:ext>
             </p:extLst>
           </p:nvPr>
         </p:nvGraphicFramePr>
         <p:xfrm>
-          <a:off x="643467" y="1200924"/>
+          <a:off x="643464" y="1200920"/>
           <a:ext cx="10905072" cy="4456159"/>
         </p:xfrm>
         <a:graphic>
@@ -15974,7 +15974,7 @@
                     <a:p>
                       <a:pPr algn="ctr" fontAlgn="ctr"/>
                       <a:r>
-                        <a:rPr lang="es-MX" sz="1400" u="none" strike="noStrike" cap="none" spc="0">
+                        <a:rPr lang="es-MX" sz="1400" u="none" strike="noStrike" cap="none" spc="0" dirty="0">
                           <a:solidFill>
                             <a:schemeClr val="tx1"/>
                           </a:solidFill>
@@ -15982,7 +15982,7 @@
                         </a:rPr>
                         <a:t>ÍNDICES ATENCIONALES</a:t>
                       </a:r>
-                      <a:endParaRPr lang="es-MX" sz="1400" b="1" i="0" u="none" strike="noStrike" cap="none" spc="0">
+                      <a:endParaRPr lang="es-MX" sz="1400" b="1" i="0" u="none" strike="noStrike" cap="none" spc="0" dirty="0">
                         <a:solidFill>
                           <a:schemeClr val="tx1"/>
                         </a:solidFill>

</xml_diff>